<commit_message>
minor updates to solver presentation
</commit_message>
<xml_diff>
--- a/timeDependent2TermPresentation.pptx
+++ b/timeDependent2TermPresentation.pptx
@@ -115,6 +115,22 @@
       </a:defRPr>
     </a:lvl9pPr>
   </p:defaultTextStyle>
+  <p:extLst>
+    <p:ext uri="{EFAFB233-063F-42B5-8137-9DF3F51BA10A}">
+      <p15:sldGuideLst xmlns:p15="http://schemas.microsoft.com/office/powerpoint/2012/main">
+        <p15:guide id="1" orient="horz" pos="2160">
+          <p15:clr>
+            <a:srgbClr val="A4A3A4"/>
+          </p15:clr>
+        </p15:guide>
+        <p15:guide id="2" pos="2880">
+          <p15:clr>
+            <a:srgbClr val="A4A3A4"/>
+          </p15:clr>
+        </p15:guide>
+      </p15:sldGuideLst>
+    </p:ext>
+  </p:extLst>
 </p:presentation>
 </file>
 
@@ -156,10 +172,9 @@
           <a:lstStyle/>
           <a:p>
             <a:r>
-              <a:rPr lang="en-US" smtClean="0"/>
+              <a:rPr lang="en-US"/>
               <a:t>Click to edit Master title style</a:t>
             </a:r>
-            <a:endParaRPr lang="en-US"/>
           </a:p>
         </p:txBody>
       </p:sp>
@@ -275,10 +290,9 @@
           </a:lstStyle>
           <a:p>
             <a:r>
-              <a:rPr lang="en-US" smtClean="0"/>
+              <a:rPr lang="en-US"/>
               <a:t>Click to edit Master subtitle style</a:t>
             </a:r>
-            <a:endParaRPr lang="en-US"/>
           </a:p>
         </p:txBody>
       </p:sp>
@@ -299,7 +313,7 @@
           <a:p>
             <a:fld id="{0914EE1C-1BF3-104A-A741-ACB81F42F5C6}" type="datetimeFigureOut">
               <a:rPr lang="en-US" smtClean="0"/>
-              <a:t>1/9/17</a:t>
+              <a:t>8/14/23</a:t>
             </a:fld>
             <a:endParaRPr lang="en-US"/>
           </a:p>
@@ -393,10 +407,9 @@
           <a:lstStyle/>
           <a:p>
             <a:r>
-              <a:rPr lang="en-US" smtClean="0"/>
+              <a:rPr lang="en-US"/>
               <a:t>Click to edit Master title style</a:t>
             </a:r>
-            <a:endParaRPr lang="en-US"/>
           </a:p>
         </p:txBody>
       </p:sp>
@@ -417,38 +430,37 @@
           <a:p>
             <a:pPr lvl="0"/>
             <a:r>
-              <a:rPr lang="en-US" smtClean="0"/>
+              <a:rPr lang="en-US"/>
               <a:t>Click to edit Master text styles</a:t>
             </a:r>
           </a:p>
           <a:p>
             <a:pPr lvl="1"/>
             <a:r>
-              <a:rPr lang="en-US" smtClean="0"/>
+              <a:rPr lang="en-US"/>
               <a:t>Second level</a:t>
             </a:r>
           </a:p>
           <a:p>
             <a:pPr lvl="2"/>
             <a:r>
-              <a:rPr lang="en-US" smtClean="0"/>
+              <a:rPr lang="en-US"/>
               <a:t>Third level</a:t>
             </a:r>
           </a:p>
           <a:p>
             <a:pPr lvl="3"/>
             <a:r>
-              <a:rPr lang="en-US" smtClean="0"/>
+              <a:rPr lang="en-US"/>
               <a:t>Fourth level</a:t>
             </a:r>
           </a:p>
           <a:p>
             <a:pPr lvl="4"/>
             <a:r>
-              <a:rPr lang="en-US" smtClean="0"/>
+              <a:rPr lang="en-US"/>
               <a:t>Fifth level</a:t>
             </a:r>
-            <a:endParaRPr lang="en-US"/>
           </a:p>
         </p:txBody>
       </p:sp>
@@ -469,7 +481,7 @@
           <a:p>
             <a:fld id="{0914EE1C-1BF3-104A-A741-ACB81F42F5C6}" type="datetimeFigureOut">
               <a:rPr lang="en-US" smtClean="0"/>
-              <a:t>1/9/17</a:t>
+              <a:t>8/14/23</a:t>
             </a:fld>
             <a:endParaRPr lang="en-US"/>
           </a:p>
@@ -568,10 +580,9 @@
           <a:lstStyle/>
           <a:p>
             <a:r>
-              <a:rPr lang="en-US" smtClean="0"/>
+              <a:rPr lang="en-US"/>
               <a:t>Click to edit Master title style</a:t>
             </a:r>
-            <a:endParaRPr lang="en-US"/>
           </a:p>
         </p:txBody>
       </p:sp>
@@ -597,38 +608,37 @@
           <a:p>
             <a:pPr lvl="0"/>
             <a:r>
-              <a:rPr lang="en-US" smtClean="0"/>
+              <a:rPr lang="en-US"/>
               <a:t>Click to edit Master text styles</a:t>
             </a:r>
           </a:p>
           <a:p>
             <a:pPr lvl="1"/>
             <a:r>
-              <a:rPr lang="en-US" smtClean="0"/>
+              <a:rPr lang="en-US"/>
               <a:t>Second level</a:t>
             </a:r>
           </a:p>
           <a:p>
             <a:pPr lvl="2"/>
             <a:r>
-              <a:rPr lang="en-US" smtClean="0"/>
+              <a:rPr lang="en-US"/>
               <a:t>Third level</a:t>
             </a:r>
           </a:p>
           <a:p>
             <a:pPr lvl="3"/>
             <a:r>
-              <a:rPr lang="en-US" smtClean="0"/>
+              <a:rPr lang="en-US"/>
               <a:t>Fourth level</a:t>
             </a:r>
           </a:p>
           <a:p>
             <a:pPr lvl="4"/>
             <a:r>
-              <a:rPr lang="en-US" smtClean="0"/>
+              <a:rPr lang="en-US"/>
               <a:t>Fifth level</a:t>
             </a:r>
-            <a:endParaRPr lang="en-US"/>
           </a:p>
         </p:txBody>
       </p:sp>
@@ -649,7 +659,7 @@
           <a:p>
             <a:fld id="{0914EE1C-1BF3-104A-A741-ACB81F42F5C6}" type="datetimeFigureOut">
               <a:rPr lang="en-US" smtClean="0"/>
-              <a:t>1/9/17</a:t>
+              <a:t>8/14/23</a:t>
             </a:fld>
             <a:endParaRPr lang="en-US"/>
           </a:p>
@@ -743,10 +753,9 @@
           <a:lstStyle/>
           <a:p>
             <a:r>
-              <a:rPr lang="en-US" smtClean="0"/>
+              <a:rPr lang="en-US"/>
               <a:t>Click to edit Master title style</a:t>
             </a:r>
-            <a:endParaRPr lang="en-US"/>
           </a:p>
         </p:txBody>
       </p:sp>
@@ -767,38 +776,37 @@
           <a:p>
             <a:pPr lvl="0"/>
             <a:r>
-              <a:rPr lang="en-US" smtClean="0"/>
+              <a:rPr lang="en-US"/>
               <a:t>Click to edit Master text styles</a:t>
             </a:r>
           </a:p>
           <a:p>
             <a:pPr lvl="1"/>
             <a:r>
-              <a:rPr lang="en-US" smtClean="0"/>
+              <a:rPr lang="en-US"/>
               <a:t>Second level</a:t>
             </a:r>
           </a:p>
           <a:p>
             <a:pPr lvl="2"/>
             <a:r>
-              <a:rPr lang="en-US" smtClean="0"/>
+              <a:rPr lang="en-US"/>
               <a:t>Third level</a:t>
             </a:r>
           </a:p>
           <a:p>
             <a:pPr lvl="3"/>
             <a:r>
-              <a:rPr lang="en-US" smtClean="0"/>
+              <a:rPr lang="en-US"/>
               <a:t>Fourth level</a:t>
             </a:r>
           </a:p>
           <a:p>
             <a:pPr lvl="4"/>
             <a:r>
-              <a:rPr lang="en-US" smtClean="0"/>
+              <a:rPr lang="en-US"/>
               <a:t>Fifth level</a:t>
             </a:r>
-            <a:endParaRPr lang="en-US"/>
           </a:p>
         </p:txBody>
       </p:sp>
@@ -819,7 +827,7 @@
           <a:p>
             <a:fld id="{0914EE1C-1BF3-104A-A741-ACB81F42F5C6}" type="datetimeFigureOut">
               <a:rPr lang="en-US" smtClean="0"/>
-              <a:t>1/9/17</a:t>
+              <a:t>8/14/23</a:t>
             </a:fld>
             <a:endParaRPr lang="en-US"/>
           </a:p>
@@ -922,10 +930,9 @@
           </a:lstStyle>
           <a:p>
             <a:r>
-              <a:rPr lang="en-US" smtClean="0"/>
+              <a:rPr lang="en-US"/>
               <a:t>Click to edit Master title style</a:t>
             </a:r>
-            <a:endParaRPr lang="en-US"/>
           </a:p>
         </p:txBody>
       </p:sp>
@@ -1042,7 +1049,7 @@
           <a:p>
             <a:pPr lvl="0"/>
             <a:r>
-              <a:rPr lang="en-US" smtClean="0"/>
+              <a:rPr lang="en-US"/>
               <a:t>Click to edit Master text styles</a:t>
             </a:r>
           </a:p>
@@ -1065,7 +1072,7 @@
           <a:p>
             <a:fld id="{0914EE1C-1BF3-104A-A741-ACB81F42F5C6}" type="datetimeFigureOut">
               <a:rPr lang="en-US" smtClean="0"/>
-              <a:t>1/9/17</a:t>
+              <a:t>8/14/23</a:t>
             </a:fld>
             <a:endParaRPr lang="en-US"/>
           </a:p>
@@ -1159,10 +1166,9 @@
           <a:lstStyle/>
           <a:p>
             <a:r>
-              <a:rPr lang="en-US" smtClean="0"/>
+              <a:rPr lang="en-US"/>
               <a:t>Click to edit Master title style</a:t>
             </a:r>
-            <a:endParaRPr lang="en-US"/>
           </a:p>
         </p:txBody>
       </p:sp>
@@ -1216,38 +1222,37 @@
           <a:p>
             <a:pPr lvl="0"/>
             <a:r>
-              <a:rPr lang="en-US" smtClean="0"/>
+              <a:rPr lang="en-US"/>
               <a:t>Click to edit Master text styles</a:t>
             </a:r>
           </a:p>
           <a:p>
             <a:pPr lvl="1"/>
             <a:r>
-              <a:rPr lang="en-US" smtClean="0"/>
+              <a:rPr lang="en-US"/>
               <a:t>Second level</a:t>
             </a:r>
           </a:p>
           <a:p>
             <a:pPr lvl="2"/>
             <a:r>
-              <a:rPr lang="en-US" smtClean="0"/>
+              <a:rPr lang="en-US"/>
               <a:t>Third level</a:t>
             </a:r>
           </a:p>
           <a:p>
             <a:pPr lvl="3"/>
             <a:r>
-              <a:rPr lang="en-US" smtClean="0"/>
+              <a:rPr lang="en-US"/>
               <a:t>Fourth level</a:t>
             </a:r>
           </a:p>
           <a:p>
             <a:pPr lvl="4"/>
             <a:r>
-              <a:rPr lang="en-US" smtClean="0"/>
+              <a:rPr lang="en-US"/>
               <a:t>Fifth level</a:t>
             </a:r>
-            <a:endParaRPr lang="en-US"/>
           </a:p>
         </p:txBody>
       </p:sp>
@@ -1301,38 +1306,37 @@
           <a:p>
             <a:pPr lvl="0"/>
             <a:r>
-              <a:rPr lang="en-US" smtClean="0"/>
+              <a:rPr lang="en-US"/>
               <a:t>Click to edit Master text styles</a:t>
             </a:r>
           </a:p>
           <a:p>
             <a:pPr lvl="1"/>
             <a:r>
-              <a:rPr lang="en-US" smtClean="0"/>
+              <a:rPr lang="en-US"/>
               <a:t>Second level</a:t>
             </a:r>
           </a:p>
           <a:p>
             <a:pPr lvl="2"/>
             <a:r>
-              <a:rPr lang="en-US" smtClean="0"/>
+              <a:rPr lang="en-US"/>
               <a:t>Third level</a:t>
             </a:r>
           </a:p>
           <a:p>
             <a:pPr lvl="3"/>
             <a:r>
-              <a:rPr lang="en-US" smtClean="0"/>
+              <a:rPr lang="en-US"/>
               <a:t>Fourth level</a:t>
             </a:r>
           </a:p>
           <a:p>
             <a:pPr lvl="4"/>
             <a:r>
-              <a:rPr lang="en-US" smtClean="0"/>
+              <a:rPr lang="en-US"/>
               <a:t>Fifth level</a:t>
             </a:r>
-            <a:endParaRPr lang="en-US"/>
           </a:p>
         </p:txBody>
       </p:sp>
@@ -1353,7 +1357,7 @@
           <a:p>
             <a:fld id="{0914EE1C-1BF3-104A-A741-ACB81F42F5C6}" type="datetimeFigureOut">
               <a:rPr lang="en-US" smtClean="0"/>
-              <a:t>1/9/17</a:t>
+              <a:t>8/14/23</a:t>
             </a:fld>
             <a:endParaRPr lang="en-US"/>
           </a:p>
@@ -1451,10 +1455,9 @@
           </a:lstStyle>
           <a:p>
             <a:r>
-              <a:rPr lang="en-US" smtClean="0"/>
+              <a:rPr lang="en-US"/>
               <a:t>Click to edit Master title style</a:t>
             </a:r>
-            <a:endParaRPr lang="en-US"/>
           </a:p>
         </p:txBody>
       </p:sp>
@@ -1517,7 +1520,7 @@
           <a:p>
             <a:pPr lvl="0"/>
             <a:r>
-              <a:rPr lang="en-US" smtClean="0"/>
+              <a:rPr lang="en-US"/>
               <a:t>Click to edit Master text styles</a:t>
             </a:r>
           </a:p>
@@ -1573,38 +1576,37 @@
           <a:p>
             <a:pPr lvl="0"/>
             <a:r>
-              <a:rPr lang="en-US" smtClean="0"/>
+              <a:rPr lang="en-US"/>
               <a:t>Click to edit Master text styles</a:t>
             </a:r>
           </a:p>
           <a:p>
             <a:pPr lvl="1"/>
             <a:r>
-              <a:rPr lang="en-US" smtClean="0"/>
+              <a:rPr lang="en-US"/>
               <a:t>Second level</a:t>
             </a:r>
           </a:p>
           <a:p>
             <a:pPr lvl="2"/>
             <a:r>
-              <a:rPr lang="en-US" smtClean="0"/>
+              <a:rPr lang="en-US"/>
               <a:t>Third level</a:t>
             </a:r>
           </a:p>
           <a:p>
             <a:pPr lvl="3"/>
             <a:r>
-              <a:rPr lang="en-US" smtClean="0"/>
+              <a:rPr lang="en-US"/>
               <a:t>Fourth level</a:t>
             </a:r>
           </a:p>
           <a:p>
             <a:pPr lvl="4"/>
             <a:r>
-              <a:rPr lang="en-US" smtClean="0"/>
+              <a:rPr lang="en-US"/>
               <a:t>Fifth level</a:t>
             </a:r>
-            <a:endParaRPr lang="en-US"/>
           </a:p>
         </p:txBody>
       </p:sp>
@@ -1667,7 +1669,7 @@
           <a:p>
             <a:pPr lvl="0"/>
             <a:r>
-              <a:rPr lang="en-US" smtClean="0"/>
+              <a:rPr lang="en-US"/>
               <a:t>Click to edit Master text styles</a:t>
             </a:r>
           </a:p>
@@ -1723,38 +1725,37 @@
           <a:p>
             <a:pPr lvl="0"/>
             <a:r>
-              <a:rPr lang="en-US" smtClean="0"/>
+              <a:rPr lang="en-US"/>
               <a:t>Click to edit Master text styles</a:t>
             </a:r>
           </a:p>
           <a:p>
             <a:pPr lvl="1"/>
             <a:r>
-              <a:rPr lang="en-US" smtClean="0"/>
+              <a:rPr lang="en-US"/>
               <a:t>Second level</a:t>
             </a:r>
           </a:p>
           <a:p>
             <a:pPr lvl="2"/>
             <a:r>
-              <a:rPr lang="en-US" smtClean="0"/>
+              <a:rPr lang="en-US"/>
               <a:t>Third level</a:t>
             </a:r>
           </a:p>
           <a:p>
             <a:pPr lvl="3"/>
             <a:r>
-              <a:rPr lang="en-US" smtClean="0"/>
+              <a:rPr lang="en-US"/>
               <a:t>Fourth level</a:t>
             </a:r>
           </a:p>
           <a:p>
             <a:pPr lvl="4"/>
             <a:r>
-              <a:rPr lang="en-US" smtClean="0"/>
+              <a:rPr lang="en-US"/>
               <a:t>Fifth level</a:t>
             </a:r>
-            <a:endParaRPr lang="en-US"/>
           </a:p>
         </p:txBody>
       </p:sp>
@@ -1775,7 +1776,7 @@
           <a:p>
             <a:fld id="{0914EE1C-1BF3-104A-A741-ACB81F42F5C6}" type="datetimeFigureOut">
               <a:rPr lang="en-US" smtClean="0"/>
-              <a:t>1/9/17</a:t>
+              <a:t>8/14/23</a:t>
             </a:fld>
             <a:endParaRPr lang="en-US"/>
           </a:p>
@@ -1869,10 +1870,9 @@
           <a:lstStyle/>
           <a:p>
             <a:r>
-              <a:rPr lang="en-US" smtClean="0"/>
+              <a:rPr lang="en-US"/>
               <a:t>Click to edit Master title style</a:t>
             </a:r>
-            <a:endParaRPr lang="en-US"/>
           </a:p>
         </p:txBody>
       </p:sp>
@@ -1893,7 +1893,7 @@
           <a:p>
             <a:fld id="{0914EE1C-1BF3-104A-A741-ACB81F42F5C6}" type="datetimeFigureOut">
               <a:rPr lang="en-US" smtClean="0"/>
-              <a:t>1/9/17</a:t>
+              <a:t>8/14/23</a:t>
             </a:fld>
             <a:endParaRPr lang="en-US"/>
           </a:p>
@@ -1988,7 +1988,7 @@
           <a:p>
             <a:fld id="{0914EE1C-1BF3-104A-A741-ACB81F42F5C6}" type="datetimeFigureOut">
               <a:rPr lang="en-US" smtClean="0"/>
-              <a:t>1/9/17</a:t>
+              <a:t>8/14/23</a:t>
             </a:fld>
             <a:endParaRPr lang="en-US"/>
           </a:p>
@@ -2091,10 +2091,9 @@
           </a:lstStyle>
           <a:p>
             <a:r>
-              <a:rPr lang="en-US" smtClean="0"/>
+              <a:rPr lang="en-US"/>
               <a:t>Click to edit Master title style</a:t>
             </a:r>
-            <a:endParaRPr lang="en-US"/>
           </a:p>
         </p:txBody>
       </p:sp>
@@ -2148,38 +2147,37 @@
           <a:p>
             <a:pPr lvl="0"/>
             <a:r>
-              <a:rPr lang="en-US" smtClean="0"/>
+              <a:rPr lang="en-US"/>
               <a:t>Click to edit Master text styles</a:t>
             </a:r>
           </a:p>
           <a:p>
             <a:pPr lvl="1"/>
             <a:r>
-              <a:rPr lang="en-US" smtClean="0"/>
+              <a:rPr lang="en-US"/>
               <a:t>Second level</a:t>
             </a:r>
           </a:p>
           <a:p>
             <a:pPr lvl="2"/>
             <a:r>
-              <a:rPr lang="en-US" smtClean="0"/>
+              <a:rPr lang="en-US"/>
               <a:t>Third level</a:t>
             </a:r>
           </a:p>
           <a:p>
             <a:pPr lvl="3"/>
             <a:r>
-              <a:rPr lang="en-US" smtClean="0"/>
+              <a:rPr lang="en-US"/>
               <a:t>Fourth level</a:t>
             </a:r>
           </a:p>
           <a:p>
             <a:pPr lvl="4"/>
             <a:r>
-              <a:rPr lang="en-US" smtClean="0"/>
+              <a:rPr lang="en-US"/>
               <a:t>Fifth level</a:t>
             </a:r>
-            <a:endParaRPr lang="en-US"/>
           </a:p>
         </p:txBody>
       </p:sp>
@@ -2242,7 +2240,7 @@
           <a:p>
             <a:pPr lvl="0"/>
             <a:r>
-              <a:rPr lang="en-US" smtClean="0"/>
+              <a:rPr lang="en-US"/>
               <a:t>Click to edit Master text styles</a:t>
             </a:r>
           </a:p>
@@ -2265,7 +2263,7 @@
           <a:p>
             <a:fld id="{0914EE1C-1BF3-104A-A741-ACB81F42F5C6}" type="datetimeFigureOut">
               <a:rPr lang="en-US" smtClean="0"/>
-              <a:t>1/9/17</a:t>
+              <a:t>8/14/23</a:t>
             </a:fld>
             <a:endParaRPr lang="en-US"/>
           </a:p>
@@ -2368,10 +2366,9 @@
           </a:lstStyle>
           <a:p>
             <a:r>
-              <a:rPr lang="en-US" smtClean="0"/>
+              <a:rPr lang="en-US"/>
               <a:t>Click to edit Master title style</a:t>
             </a:r>
-            <a:endParaRPr lang="en-US"/>
           </a:p>
         </p:txBody>
       </p:sp>
@@ -2495,7 +2492,7 @@
           <a:p>
             <a:pPr lvl="0"/>
             <a:r>
-              <a:rPr lang="en-US" smtClean="0"/>
+              <a:rPr lang="en-US"/>
               <a:t>Click to edit Master text styles</a:t>
             </a:r>
           </a:p>
@@ -2518,7 +2515,7 @@
           <a:p>
             <a:fld id="{0914EE1C-1BF3-104A-A741-ACB81F42F5C6}" type="datetimeFigureOut">
               <a:rPr lang="en-US" smtClean="0"/>
-              <a:t>1/9/17</a:t>
+              <a:t>8/14/23</a:t>
             </a:fld>
             <a:endParaRPr lang="en-US"/>
           </a:p>
@@ -2627,10 +2624,9 @@
           <a:lstStyle/>
           <a:p>
             <a:r>
-              <a:rPr lang="en-US" smtClean="0"/>
+              <a:rPr lang="en-US"/>
               <a:t>Click to edit Master title style</a:t>
             </a:r>
-            <a:endParaRPr lang="en-US"/>
           </a:p>
         </p:txBody>
       </p:sp>
@@ -2661,38 +2657,37 @@
           <a:p>
             <a:pPr lvl="0"/>
             <a:r>
-              <a:rPr lang="en-US" smtClean="0"/>
+              <a:rPr lang="en-US"/>
               <a:t>Click to edit Master text styles</a:t>
             </a:r>
           </a:p>
           <a:p>
             <a:pPr lvl="1"/>
             <a:r>
-              <a:rPr lang="en-US" smtClean="0"/>
+              <a:rPr lang="en-US"/>
               <a:t>Second level</a:t>
             </a:r>
           </a:p>
           <a:p>
             <a:pPr lvl="2"/>
             <a:r>
-              <a:rPr lang="en-US" smtClean="0"/>
+              <a:rPr lang="en-US"/>
               <a:t>Third level</a:t>
             </a:r>
           </a:p>
           <a:p>
             <a:pPr lvl="3"/>
             <a:r>
-              <a:rPr lang="en-US" smtClean="0"/>
+              <a:rPr lang="en-US"/>
               <a:t>Fourth level</a:t>
             </a:r>
           </a:p>
           <a:p>
             <a:pPr lvl="4"/>
             <a:r>
-              <a:rPr lang="en-US" smtClean="0"/>
+              <a:rPr lang="en-US"/>
               <a:t>Fifth level</a:t>
             </a:r>
-            <a:endParaRPr lang="en-US"/>
           </a:p>
         </p:txBody>
       </p:sp>
@@ -2731,7 +2726,7 @@
           <a:p>
             <a:fld id="{0914EE1C-1BF3-104A-A741-ACB81F42F5C6}" type="datetimeFigureOut">
               <a:rPr lang="en-US" smtClean="0"/>
-              <a:t>1/9/17</a:t>
+              <a:t>8/14/23</a:t>
             </a:fld>
             <a:endParaRPr lang="en-US"/>
           </a:p>
@@ -3124,10 +3119,9 @@
           <a:lstStyle/>
           <a:p>
             <a:r>
-              <a:rPr lang="en-US" dirty="0" smtClean="0"/>
+              <a:rPr lang="en-US" dirty="0"/>
               <a:t>Time-Dependent Two-Term Boltzmann Solver for Non-Equilibrium Gas Discharge Studies</a:t>
             </a:r>
-            <a:endParaRPr lang="en-US" dirty="0"/>
           </a:p>
         </p:txBody>
       </p:sp>
@@ -3147,16 +3141,15 @@
           <a:lstStyle/>
           <a:p>
             <a:r>
-              <a:rPr lang="en-US" dirty="0" smtClean="0"/>
+              <a:rPr lang="en-US" dirty="0"/>
               <a:t>Justin R Angus</a:t>
             </a:r>
           </a:p>
           <a:p>
             <a:r>
-              <a:rPr lang="en-US" dirty="0" smtClean="0"/>
+              <a:rPr lang="en-US" dirty="0"/>
               <a:t>6-29-16</a:t>
             </a:r>
-            <a:endParaRPr lang="en-US" dirty="0"/>
           </a:p>
         </p:txBody>
       </p:sp>
@@ -3170,13 +3163,6 @@
   <p:clrMapOvr>
     <a:masterClrMapping/>
   </p:clrMapOvr>
-  <p:timing>
-    <p:tnLst>
-      <p:par>
-        <p:cTn xmlns:p14="http://schemas.microsoft.com/office/powerpoint/2010/main" id="1" dur="indefinite" restart="never" nodeType="tmRoot"/>
-      </p:par>
-    </p:tnLst>
-  </p:timing>
 </p:sld>
 </file>
 
@@ -3213,18 +3199,17 @@
           <a:lstStyle/>
           <a:p>
             <a:r>
-              <a:rPr lang="en-US" dirty="0" smtClean="0"/>
+              <a:rPr lang="en-US" dirty="0"/>
               <a:t>Example Input File (</a:t>
             </a:r>
             <a:r>
-              <a:rPr lang="en-US" dirty="0" err="1" smtClean="0"/>
+              <a:rPr lang="en-US" dirty="0" err="1"/>
               <a:t>input.json</a:t>
             </a:r>
             <a:r>
-              <a:rPr lang="en-US" dirty="0" smtClean="0"/>
+              <a:rPr lang="en-US" dirty="0"/>
               <a:t>)</a:t>
             </a:r>
-            <a:endParaRPr lang="en-US" dirty="0"/>
           </a:p>
         </p:txBody>
       </p:sp>
@@ -3277,27 +3262,27 @@
           <a:lstStyle/>
           <a:p>
             <a:r>
-              <a:rPr lang="en-US" dirty="0" smtClean="0"/>
+              <a:rPr lang="en-US" dirty="0"/>
               <a:t>Code uses </a:t>
             </a:r>
             <a:r>
-              <a:rPr lang="en-US" dirty="0" err="1" smtClean="0"/>
+              <a:rPr lang="en-US" dirty="0" err="1"/>
               <a:t>json</a:t>
             </a:r>
             <a:r>
-              <a:rPr lang="en-US" dirty="0" smtClean="0"/>
+              <a:rPr lang="en-US" dirty="0"/>
               <a:t> format for input files (JavaScript Object Notation)</a:t>
             </a:r>
           </a:p>
           <a:p>
             <a:r>
-              <a:rPr lang="en-US" dirty="0" smtClean="0"/>
+              <a:rPr lang="en-US" dirty="0"/>
               <a:t>Easy to read and write</a:t>
             </a:r>
           </a:p>
           <a:p>
             <a:r>
-              <a:rPr lang="en-US" dirty="0" smtClean="0"/>
+              <a:rPr lang="en-US" dirty="0"/>
               <a:t>Easy to parse and generate</a:t>
             </a:r>
           </a:p>
@@ -3316,13 +3301,6 @@
   <p:clrMapOvr>
     <a:masterClrMapping/>
   </p:clrMapOvr>
-  <p:timing>
-    <p:tnLst>
-      <p:par>
-        <p:cTn xmlns:p14="http://schemas.microsoft.com/office/powerpoint/2010/main" id="1" dur="indefinite" restart="never" nodeType="tmRoot"/>
-      </p:par>
-    </p:tnLst>
-  </p:timing>
 </p:sld>
 </file>
 
@@ -3400,10 +3378,9 @@
           <a:lstStyle/>
           <a:p>
             <a:r>
-              <a:rPr lang="en-US" dirty="0" smtClean="0"/>
+              <a:rPr lang="en-US" dirty="0"/>
               <a:t>HDF5 class for writing to output</a:t>
             </a:r>
-            <a:endParaRPr lang="en-US" dirty="0"/>
           </a:p>
         </p:txBody>
       </p:sp>
@@ -4698,12 +4675,8 @@
               <a:buNone/>
             </a:pPr>
             <a:r>
-              <a:rPr lang="en-US" sz="700" b="1" dirty="0" smtClean="0"/>
-              <a:t>   for</a:t>
-            </a:r>
-            <a:r>
-              <a:rPr lang="en-US" sz="700" b="1" dirty="0"/>
-              <a:t>(vector&lt; </a:t>
+              <a:rPr lang="en-US" sz="700" b="1" dirty="0"/>
+              <a:t>   for(vector&lt; </a:t>
             </a:r>
             <a:r>
               <a:rPr lang="en-US" sz="700" b="1" dirty="0" err="1"/>
@@ -4736,11 +4709,7 @@
             </a:pPr>
             <a:r>
               <a:rPr lang="en-US" sz="700" b="1" dirty="0"/>
-              <a:t>      if(it-&gt;grow==1) </a:t>
-            </a:r>
-            <a:r>
-              <a:rPr lang="en-US" sz="700" b="1" dirty="0" smtClean="0"/>
-              <a:t>{</a:t>
+              <a:t>      if(it-&gt;grow==1) {</a:t>
             </a:r>
           </a:p>
           <a:p>
@@ -4749,14 +4718,10 @@
             </a:pPr>
             <a:r>
               <a:rPr lang="en-US" sz="700" b="1" dirty="0"/>
-              <a:t> </a:t>
-            </a:r>
-            <a:r>
-              <a:rPr lang="en-US" sz="700" b="1" dirty="0" smtClean="0"/>
-              <a:t>        </a:t>
-            </a:r>
-            <a:r>
-              <a:rPr lang="en-US" sz="700" b="1" dirty="0" err="1" smtClean="0"/>
+              <a:t>         </a:t>
+            </a:r>
+            <a:r>
+              <a:rPr lang="en-US" sz="700" b="1" dirty="0" err="1"/>
               <a:t>appendSclInOutput</a:t>
             </a:r>
             <a:r>
@@ -4803,12 +4768,8 @@
               <a:buNone/>
             </a:pPr>
             <a:r>
-              <a:rPr lang="en-US" sz="700" b="1" dirty="0" smtClean="0"/>
-              <a:t>   for</a:t>
-            </a:r>
-            <a:r>
-              <a:rPr lang="en-US" sz="700" b="1" dirty="0"/>
-              <a:t>(vector&lt; </a:t>
+              <a:rPr lang="en-US" sz="700" b="1" dirty="0"/>
+              <a:t>   for(vector&lt; </a:t>
             </a:r>
             <a:r>
               <a:rPr lang="en-US" sz="700" b="1" dirty="0" err="1"/>
@@ -4849,11 +4810,11 @@
               <a:buNone/>
             </a:pPr>
             <a:r>
-              <a:rPr lang="en-US" sz="700" b="1" dirty="0" smtClean="0"/>
+              <a:rPr lang="en-US" sz="700" b="1" dirty="0"/>
               <a:t>         </a:t>
             </a:r>
             <a:r>
-              <a:rPr lang="en-US" sz="700" b="1" dirty="0" err="1" smtClean="0"/>
+              <a:rPr lang="en-US" sz="700" b="1" dirty="0" err="1"/>
               <a:t>appendVecInOutput</a:t>
             </a:r>
             <a:r>
@@ -4933,7 +4894,7 @@
               <a:buChar char="•"/>
             </a:pPr>
             <a:r>
-              <a:rPr lang="en-US" sz="1200" dirty="0" smtClean="0"/>
+              <a:rPr lang="en-US" sz="1200" dirty="0"/>
               <a:t>All variables added to output file during initialization</a:t>
             </a:r>
           </a:p>
@@ -4943,15 +4904,15 @@
               <a:buChar char="•"/>
             </a:pPr>
             <a:r>
-              <a:rPr lang="en-US" sz="1200" dirty="0" smtClean="0"/>
+              <a:rPr lang="en-US" sz="1200" dirty="0"/>
               <a:t>All growing variables are written to output file at specified output times using </a:t>
             </a:r>
             <a:r>
-              <a:rPr lang="en-US" sz="1200" dirty="0" err="1" smtClean="0"/>
+              <a:rPr lang="en-US" sz="1200" dirty="0" err="1"/>
               <a:t>writeAll</a:t>
             </a:r>
             <a:r>
-              <a:rPr lang="en-US" sz="1200" dirty="0" smtClean="0"/>
+              <a:rPr lang="en-US" sz="1200" dirty="0"/>
               <a:t>() function</a:t>
             </a:r>
           </a:p>
@@ -4967,13 +4928,6 @@
   <p:clrMapOvr>
     <a:masterClrMapping/>
   </p:clrMapOvr>
-  <p:timing>
-    <p:tnLst>
-      <p:par>
-        <p:cTn xmlns:p14="http://schemas.microsoft.com/office/powerpoint/2010/main" id="1" dur="indefinite" restart="never" nodeType="tmRoot"/>
-      </p:par>
-    </p:tnLst>
-  </p:timing>
 </p:sld>
 </file>
 
@@ -5010,10 +4964,9 @@
           <a:lstStyle/>
           <a:p>
             <a:r>
-              <a:rPr lang="en-US" dirty="0" smtClean="0"/>
+              <a:rPr lang="en-US" dirty="0"/>
               <a:t>Now and Later of Model</a:t>
             </a:r>
-            <a:endParaRPr lang="en-US" dirty="0"/>
           </a:p>
         </p:txBody>
       </p:sp>
@@ -5033,10 +4986,9 @@
           <a:lstStyle/>
           <a:p>
             <a:r>
-              <a:rPr lang="en-US" dirty="0" smtClean="0"/>
+              <a:rPr lang="en-US" dirty="0"/>
               <a:t>Now</a:t>
             </a:r>
-            <a:endParaRPr lang="en-US" dirty="0"/>
           </a:p>
         </p:txBody>
       </p:sp>
@@ -5058,50 +5010,50 @@
           <a:lstStyle/>
           <a:p>
             <a:r>
-              <a:rPr lang="en-US" dirty="0" smtClean="0"/>
+              <a:rPr lang="en-US" dirty="0"/>
               <a:t>Developed 2</a:t>
             </a:r>
             <a:r>
-              <a:rPr lang="en-US" baseline="30000" dirty="0" smtClean="0"/>
+              <a:rPr lang="en-US" baseline="30000" dirty="0"/>
               <a:t>nd</a:t>
             </a:r>
             <a:r>
-              <a:rPr lang="en-US" dirty="0" smtClean="0"/>
+              <a:rPr lang="en-US" dirty="0"/>
               <a:t> order finite volume, 2</a:t>
             </a:r>
             <a:r>
-              <a:rPr lang="en-US" baseline="30000" dirty="0" smtClean="0"/>
+              <a:rPr lang="en-US" baseline="30000" dirty="0"/>
               <a:t>nd</a:t>
             </a:r>
             <a:r>
-              <a:rPr lang="en-US" dirty="0" smtClean="0"/>
+              <a:rPr lang="en-US" dirty="0"/>
               <a:t> order implicit time algorithm for two-term Boltzmann equation</a:t>
             </a:r>
           </a:p>
           <a:p>
             <a:r>
-              <a:rPr lang="en-US" dirty="0" smtClean="0"/>
+              <a:rPr lang="en-US" dirty="0"/>
               <a:t>Can perform time-dependent EEDF studies for a single gas species with elastic, excitation, and ionization reactions</a:t>
             </a:r>
           </a:p>
           <a:p>
             <a:r>
-              <a:rPr lang="en-US" dirty="0" smtClean="0"/>
+              <a:rPr lang="en-US" dirty="0"/>
               <a:t>Ionization reactions can have equal or zero energy sharing</a:t>
             </a:r>
           </a:p>
           <a:p>
-            <a:endParaRPr lang="en-US" dirty="0" smtClean="0"/>
-          </a:p>
-          <a:p>
-            <a:endParaRPr lang="en-US" dirty="0" smtClean="0"/>
-          </a:p>
-          <a:p>
-            <a:endParaRPr lang="en-US" dirty="0" smtClean="0"/>
-          </a:p>
-          <a:p>
             <a:endParaRPr lang="en-US" dirty="0"/>
           </a:p>
+          <a:p>
+            <a:endParaRPr lang="en-US" dirty="0"/>
+          </a:p>
+          <a:p>
+            <a:endParaRPr lang="en-US" dirty="0"/>
+          </a:p>
+          <a:p>
+            <a:endParaRPr lang="en-US" dirty="0"/>
+          </a:p>
         </p:txBody>
       </p:sp>
       <p:sp>
@@ -5120,10 +5072,9 @@
           <a:lstStyle/>
           <a:p>
             <a:r>
-              <a:rPr lang="en-US" dirty="0" smtClean="0"/>
+              <a:rPr lang="en-US" dirty="0"/>
               <a:t>Later</a:t>
             </a:r>
-            <a:endParaRPr lang="en-US" dirty="0"/>
           </a:p>
         </p:txBody>
       </p:sp>
@@ -5145,31 +5096,19 @@
           <a:lstStyle/>
           <a:p>
             <a:r>
-              <a:rPr lang="en-US" dirty="0" smtClean="0"/>
+              <a:rPr lang="en-US" dirty="0"/>
               <a:t>Benchmark current model with </a:t>
             </a:r>
             <a:r>
-              <a:rPr lang="en-US" dirty="0" err="1" smtClean="0"/>
+              <a:rPr lang="en-US" dirty="0" err="1"/>
               <a:t>McSwarm</a:t>
             </a:r>
-            <a:endParaRPr lang="en-US" dirty="0" smtClean="0"/>
-          </a:p>
-          <a:p>
-            <a:r>
-              <a:rPr lang="en-US" dirty="0" smtClean="0"/>
-              <a:t>Include </a:t>
-            </a:r>
+            <a:endParaRPr lang="en-US" dirty="0"/>
+          </a:p>
+          <a:p>
             <a:r>
               <a:rPr lang="en-US" dirty="0"/>
-              <a:t>beam source and use </a:t>
-            </a:r>
-            <a:r>
-              <a:rPr lang="en-US" dirty="0" smtClean="0"/>
-              <a:t>Opal </a:t>
-            </a:r>
-            <a:r>
-              <a:rPr lang="en-US" dirty="0"/>
-              <a:t>for energy sharing during ionization</a:t>
+              <a:t>Include beam source and use Opal for energy sharing during ionization</a:t>
             </a:r>
           </a:p>
           <a:p>
@@ -5230,18 +5169,11 @@
   <p:clrMapOvr>
     <a:masterClrMapping/>
   </p:clrMapOvr>
-  <p:timing>
-    <p:tnLst>
-      <p:par>
-        <p:cTn xmlns:p14="http://schemas.microsoft.com/office/powerpoint/2010/main" id="1" dur="indefinite" restart="never" nodeType="tmRoot"/>
-      </p:par>
-    </p:tnLst>
-  </p:timing>
 </p:sld>
 </file>
 
 <file path=ppt/slides/slide2.xml><?xml version="1.0" encoding="utf-8"?>
-<p:sld xmlns:a="http://schemas.openxmlformats.org/drawingml/2006/main" xmlns:r="http://schemas.openxmlformats.org/officeDocument/2006/relationships" xmlns:p="http://schemas.openxmlformats.org/presentationml/2006/main" show="0">
+<p:sld xmlns:a="http://schemas.openxmlformats.org/drawingml/2006/main" xmlns:r="http://schemas.openxmlformats.org/officeDocument/2006/relationships" xmlns:p="http://schemas.openxmlformats.org/presentationml/2006/main">
   <p:cSld>
     <p:spTree>
       <p:nvGrpSpPr>
@@ -5273,10 +5205,9 @@
           <a:lstStyle/>
           <a:p>
             <a:r>
-              <a:rPr lang="en-US" dirty="0" smtClean="0"/>
+              <a:rPr lang="en-US" dirty="0"/>
               <a:t>Outline</a:t>
             </a:r>
-            <a:endParaRPr lang="en-US" dirty="0"/>
           </a:p>
         </p:txBody>
       </p:sp>
@@ -5298,80 +5229,127 @@
           <a:lstStyle/>
           <a:p>
             <a:r>
-              <a:rPr lang="en-US" dirty="0" smtClean="0"/>
+              <a:rPr lang="en-US" dirty="0"/>
               <a:t>Need for time-dependent Boltzmann solver</a:t>
             </a:r>
           </a:p>
           <a:p>
             <a:r>
-              <a:rPr lang="en-US" dirty="0" smtClean="0"/>
+              <a:rPr lang="en-US" dirty="0"/>
               <a:t>Governing equation</a:t>
             </a:r>
           </a:p>
           <a:p>
             <a:r>
-              <a:rPr lang="en-US" dirty="0" smtClean="0"/>
+              <a:rPr lang="en-US" dirty="0"/>
               <a:t>Some code details</a:t>
             </a:r>
           </a:p>
           <a:p>
             <a:r>
-              <a:rPr lang="en-US" dirty="0" smtClean="0"/>
+              <a:rPr lang="en-US" dirty="0"/>
               <a:t>Verification tests done using N2 cross sections at P=1Torr and driving to steady state</a:t>
             </a:r>
           </a:p>
           <a:p>
             <a:pPr lvl="1"/>
             <a:r>
-              <a:rPr lang="en-US" dirty="0" smtClean="0"/>
+              <a:rPr lang="en-US" dirty="0"/>
               <a:t>Elastic-momentum exchange only</a:t>
             </a:r>
           </a:p>
           <a:p>
             <a:pPr lvl="1"/>
             <a:r>
-              <a:rPr lang="en-US" dirty="0" smtClean="0"/>
+              <a:rPr lang="en-US" dirty="0"/>
               <a:t>E/N = 100Td (excitations dominant process)</a:t>
             </a:r>
           </a:p>
           <a:p>
             <a:pPr lvl="1"/>
             <a:r>
-              <a:rPr lang="en-US" dirty="0" smtClean="0"/>
+              <a:rPr lang="en-US" dirty="0"/>
               <a:t>E/N = 1000Td (ionization dominant process)</a:t>
             </a:r>
           </a:p>
           <a:p>
             <a:pPr lvl="2"/>
             <a:r>
-              <a:rPr lang="en-US" dirty="0" smtClean="0"/>
+              <a:rPr lang="en-US" dirty="0"/>
               <a:t>Equal energy sharing</a:t>
             </a:r>
           </a:p>
           <a:p>
             <a:pPr lvl="2"/>
             <a:r>
-              <a:rPr lang="en-US" dirty="0" smtClean="0"/>
+              <a:rPr lang="en-US" dirty="0"/>
               <a:t>Zero energy sharing</a:t>
             </a:r>
           </a:p>
           <a:p>
             <a:r>
-              <a:rPr lang="en-US" dirty="0" smtClean="0"/>
+              <a:rPr lang="en-US" dirty="0"/>
               <a:t>Example input file</a:t>
             </a:r>
           </a:p>
           <a:p>
             <a:r>
-              <a:rPr lang="en-US" dirty="0" smtClean="0"/>
+              <a:rPr lang="en-US" dirty="0"/>
               <a:t>Summary and future</a:t>
             </a:r>
           </a:p>
           <a:p>
-            <a:endParaRPr lang="en-US" dirty="0" smtClean="0"/>
-          </a:p>
-          <a:p>
             <a:endParaRPr lang="en-US" dirty="0"/>
+          </a:p>
+          <a:p>
+            <a:endParaRPr lang="en-US" dirty="0"/>
+          </a:p>
+        </p:txBody>
+      </p:sp>
+      <p:sp>
+        <p:nvSpPr>
+          <p:cNvPr id="4" name="TextBox 3">
+            <a:extLst>
+              <a:ext uri="{FF2B5EF4-FFF2-40B4-BE49-F238E27FC236}">
+                <a16:creationId xmlns:a16="http://schemas.microsoft.com/office/drawing/2014/main" id="{CBC4CF9D-9DEA-3D9A-600E-95008135563D}"/>
+              </a:ext>
+            </a:extLst>
+          </p:cNvPr>
+          <p:cNvSpPr txBox="1"/>
+          <p:nvPr/>
+        </p:nvSpPr>
+        <p:spPr>
+          <a:xfrm>
+            <a:off x="148590" y="6398696"/>
+            <a:ext cx="1835054" cy="369332"/>
+          </a:xfrm>
+          <a:prstGeom prst="rect">
+            <a:avLst/>
+          </a:prstGeom>
+          <a:noFill/>
+        </p:spPr>
+        <p:txBody>
+          <a:bodyPr wrap="none" rtlCol="0">
+            <a:spAutoFit/>
+          </a:bodyPr>
+          <a:lstStyle/>
+          <a:p>
+            <a:r>
+              <a:rPr lang="en-US" dirty="0"/>
+              <a:t>1 Td = 10</a:t>
+            </a:r>
+            <a:r>
+              <a:rPr lang="en-US" baseline="30000" dirty="0"/>
+              <a:t>-17</a:t>
+            </a:r>
+            <a:r>
+              <a:rPr lang="en-US" dirty="0"/>
+              <a:t> V-cm</a:t>
+            </a:r>
+            <a:r>
+              <a:rPr lang="en-US" baseline="30000" dirty="0"/>
+              <a:t>2</a:t>
+            </a:r>
           </a:p>
         </p:txBody>
       </p:sp>
@@ -5385,26 +5363,11 @@
   <p:clrMapOvr>
     <a:masterClrMapping/>
   </p:clrMapOvr>
-  <mc:AlternateContent xmlns:mc="http://schemas.openxmlformats.org/markup-compatibility/2006">
-    <mc:Choice xmlns:p14="http://schemas.microsoft.com/office/powerpoint/2010/main" Requires="p14">
-      <p:transition spd="slow" p14:dur="2000"/>
-    </mc:Choice>
-    <mc:Fallback>
-      <p:transition xmlns:p14="http://schemas.microsoft.com/office/powerpoint/2010/main" spd="slow"/>
-    </mc:Fallback>
-  </mc:AlternateContent>
-  <p:timing>
-    <p:tnLst>
-      <p:par>
-        <p:cTn xmlns:p14="http://schemas.microsoft.com/office/powerpoint/2010/main" id="1" dur="indefinite" restart="never" nodeType="tmRoot"/>
-      </p:par>
-    </p:tnLst>
-  </p:timing>
 </p:sld>
 </file>
 
 <file path=ppt/slides/slide3.xml><?xml version="1.0" encoding="utf-8"?>
-<p:sld xmlns:a="http://schemas.openxmlformats.org/drawingml/2006/main" xmlns:r="http://schemas.openxmlformats.org/officeDocument/2006/relationships" xmlns:p="http://schemas.openxmlformats.org/presentationml/2006/main" show="0">
+<p:sld xmlns:a="http://schemas.openxmlformats.org/drawingml/2006/main" xmlns:r="http://schemas.openxmlformats.org/officeDocument/2006/relationships" xmlns:p="http://schemas.openxmlformats.org/presentationml/2006/main">
   <p:cSld>
     <p:spTree>
       <p:nvGrpSpPr>
@@ -5438,10 +5401,9 @@
           <a:lstStyle/>
           <a:p>
             <a:r>
-              <a:rPr lang="en-US" dirty="0" smtClean="0"/>
+              <a:rPr lang="en-US" dirty="0"/>
               <a:t>Two-Term and Maxwellian Reaction rates in nitrogen at P=1Torr</a:t>
             </a:r>
-            <a:endParaRPr lang="en-US" dirty="0"/>
           </a:p>
         </p:txBody>
       </p:sp>
@@ -5500,7 +5462,7 @@
               <a:buChar char="•"/>
             </a:pPr>
             <a:r>
-              <a:rPr lang="en-US" dirty="0" smtClean="0"/>
+              <a:rPr lang="en-US" dirty="0"/>
               <a:t>Solid lines are computed using a Maxwellian EEDF</a:t>
             </a:r>
           </a:p>
@@ -5510,7 +5472,7 @@
               <a:buChar char="•"/>
             </a:pPr>
             <a:r>
-              <a:rPr lang="en-US" dirty="0" smtClean="0"/>
+              <a:rPr lang="en-US" dirty="0"/>
               <a:t>Dashed lines are computed using the Two-Term EEDF</a:t>
             </a:r>
           </a:p>
@@ -5520,7 +5482,7 @@
               <a:buChar char="•"/>
             </a:pPr>
             <a:r>
-              <a:rPr lang="en-US" dirty="0" smtClean="0"/>
+              <a:rPr lang="en-US" dirty="0"/>
               <a:t>Rates scale linearly with pressure</a:t>
             </a:r>
           </a:p>
@@ -5530,19 +5492,19 @@
               <a:buChar char="•"/>
             </a:pPr>
             <a:r>
-              <a:rPr lang="en-US" dirty="0" smtClean="0"/>
+              <a:rPr lang="en-US" dirty="0"/>
               <a:t>Energy relaxation rate is on the order of 100ns for 100mTorr and </a:t>
             </a:r>
             <a:r>
-              <a:rPr lang="en-US" dirty="0" err="1" smtClean="0"/>
+              <a:rPr lang="en-US" dirty="0" err="1"/>
               <a:t>T</a:t>
             </a:r>
             <a:r>
-              <a:rPr lang="en-US" baseline="-25000" dirty="0" err="1" smtClean="0"/>
+              <a:rPr lang="en-US" baseline="-25000" dirty="0" err="1"/>
               <a:t>e</a:t>
             </a:r>
             <a:r>
-              <a:rPr lang="en-US" dirty="0" smtClean="0"/>
+              <a:rPr lang="en-US" dirty="0"/>
               <a:t> order unity</a:t>
             </a:r>
           </a:p>
@@ -5552,10 +5514,9 @@
               <a:buChar char="•"/>
             </a:pPr>
             <a:r>
-              <a:rPr lang="en-US" dirty="0" smtClean="0"/>
+              <a:rPr lang="en-US" dirty="0"/>
               <a:t>Momentum relaxation rate is on the order of 1ns for 100mTorr</a:t>
             </a:r>
-            <a:endParaRPr lang="en-US" dirty="0"/>
           </a:p>
         </p:txBody>
       </p:sp>
@@ -5569,21 +5530,6 @@
   <p:clrMapOvr>
     <a:masterClrMapping/>
   </p:clrMapOvr>
-  <mc:AlternateContent xmlns:mc="http://schemas.openxmlformats.org/markup-compatibility/2006">
-    <mc:Choice xmlns:p14="http://schemas.microsoft.com/office/powerpoint/2010/main" Requires="p14">
-      <p:transition spd="slow" p14:dur="2000"/>
-    </mc:Choice>
-    <mc:Fallback>
-      <p:transition xmlns:p14="http://schemas.microsoft.com/office/powerpoint/2010/main" spd="slow"/>
-    </mc:Fallback>
-  </mc:AlternateContent>
-  <p:timing>
-    <p:tnLst>
-      <p:par>
-        <p:cTn xmlns:p14="http://schemas.microsoft.com/office/powerpoint/2010/main" id="1" dur="indefinite" restart="never" nodeType="tmRoot"/>
-      </p:par>
-    </p:tnLst>
-  </p:timing>
 </p:sld>
 </file>
 
@@ -5627,10 +5573,9 @@
           <a:lstStyle/>
           <a:p>
             <a:r>
-              <a:rPr lang="en-US" sz="3000" dirty="0" smtClean="0"/>
+              <a:rPr lang="en-US" sz="3000" dirty="0"/>
               <a:t>A time dependent equation for the EEDF is needed for time scales comparable to or shorter than the energy relaxation time and when multiple species are affecting the shape of the EEDF</a:t>
             </a:r>
-            <a:endParaRPr lang="en-US" sz="3000" dirty="0"/>
           </a:p>
         </p:txBody>
       </p:sp>
@@ -5657,42 +5602,37 @@
           <a:lstStyle/>
           <a:p>
             <a:r>
-              <a:rPr lang="en-US" sz="2400" dirty="0" smtClean="0"/>
+              <a:rPr lang="en-US" sz="2400" dirty="0"/>
               <a:t>Equation above is obtained by expanding the distribution function in Legendre polynomials, assuming the electric field is weak enough that the distribution function is weakly anisotropic, and that momentum relaxation is fast</a:t>
             </a:r>
           </a:p>
           <a:p>
             <a:r>
               <a:rPr lang="en-US" sz="2400" dirty="0"/>
-              <a:t>W, D, and S are the energy space advection, diffusion, and source coefficients, </a:t>
-            </a:r>
-            <a:r>
-              <a:rPr lang="en-US" sz="2400" dirty="0" smtClean="0"/>
-              <a:t>respectively</a:t>
-            </a:r>
-          </a:p>
-          <a:p>
-            <a:r>
-              <a:rPr lang="en-US" sz="2400" dirty="0" smtClean="0"/>
+              <a:t>W, D, and S are the energy space advection, diffusion, and source coefficients, respectively</a:t>
+            </a:r>
+          </a:p>
+          <a:p>
+            <a:r>
+              <a:rPr lang="en-US" sz="2400" dirty="0"/>
               <a:t>Steady state solvers obtain F</a:t>
             </a:r>
             <a:r>
-              <a:rPr lang="en-US" sz="2400" baseline="-25000" dirty="0" smtClean="0"/>
+              <a:rPr lang="en-US" sz="2400" baseline="-25000" dirty="0"/>
               <a:t>0</a:t>
             </a:r>
             <a:r>
-              <a:rPr lang="en-US" sz="2400" dirty="0" smtClean="0"/>
+              <a:rPr lang="en-US" sz="2400" dirty="0"/>
               <a:t> (EEDF) from above equation by setting ∂F</a:t>
             </a:r>
             <a:r>
-              <a:rPr lang="en-US" sz="2400" baseline="-25000" dirty="0" smtClean="0"/>
+              <a:rPr lang="en-US" sz="2400" baseline="-25000" dirty="0"/>
               <a:t>0</a:t>
             </a:r>
             <a:r>
-              <a:rPr lang="en-US" sz="2400" dirty="0" smtClean="0"/>
+              <a:rPr lang="en-US" sz="2400" dirty="0"/>
               <a:t>/∂t=0</a:t>
             </a:r>
-            <a:endParaRPr lang="en-US" sz="2400" dirty="0"/>
           </a:p>
         </p:txBody>
       </p:sp>
@@ -5764,13 +5704,6 @@
   <p:clrMapOvr>
     <a:masterClrMapping/>
   </p:clrMapOvr>
-  <p:timing>
-    <p:tnLst>
-      <p:par>
-        <p:cTn xmlns:p14="http://schemas.microsoft.com/office/powerpoint/2010/main" id="1" dur="indefinite" restart="never" nodeType="tmRoot"/>
-      </p:par>
-    </p:tnLst>
-  </p:timing>
 </p:sld>
 </file>
 
@@ -5807,10 +5740,9 @@
           <a:lstStyle/>
           <a:p>
             <a:r>
-              <a:rPr lang="en-US" dirty="0" smtClean="0"/>
+              <a:rPr lang="en-US" dirty="0"/>
               <a:t>Time-dependent solver details</a:t>
             </a:r>
-            <a:endParaRPr lang="en-US" dirty="0"/>
           </a:p>
         </p:txBody>
       </p:sp>
@@ -5837,82 +5769,74 @@
           <a:lstStyle/>
           <a:p>
             <a:r>
-              <a:rPr lang="en-US" dirty="0" smtClean="0"/>
-              <a:t>Writing code using </a:t>
-            </a:r>
-            <a:r>
               <a:rPr lang="en-US" dirty="0"/>
-              <a:t>C</a:t>
-            </a:r>
-            <a:r>
-              <a:rPr lang="en-US" dirty="0" smtClean="0"/>
-              <a:t>++</a:t>
-            </a:r>
-          </a:p>
-          <a:p>
-            <a:r>
-              <a:rPr lang="en-US" dirty="0" smtClean="0"/>
+              <a:t>Writing code using C++</a:t>
+            </a:r>
+          </a:p>
+          <a:p>
+            <a:r>
+              <a:rPr lang="en-US" dirty="0"/>
               <a:t>JSON format is used for input files</a:t>
             </a:r>
           </a:p>
           <a:p>
             <a:r>
-              <a:rPr lang="en-US" dirty="0" smtClean="0"/>
+              <a:rPr lang="en-US" dirty="0"/>
               <a:t>h5 format used for writing to output files</a:t>
             </a:r>
           </a:p>
           <a:p>
             <a:r>
-              <a:rPr lang="en-US" dirty="0" smtClean="0"/>
+              <a:rPr lang="en-US" dirty="0"/>
               <a:t>All reactions and cross sections </a:t>
             </a:r>
             <a:r>
-              <a:rPr lang="en-US" dirty="0" err="1" smtClean="0"/>
+              <a:rPr lang="en-US" dirty="0" err="1"/>
               <a:t>vs</a:t>
             </a:r>
             <a:r>
-              <a:rPr lang="en-US" dirty="0" smtClean="0"/>
+              <a:rPr lang="en-US" dirty="0"/>
               <a:t> energy are specified in a text file</a:t>
             </a:r>
           </a:p>
           <a:p>
             <a:pPr lvl="1"/>
             <a:r>
-              <a:rPr lang="en-US" dirty="0" smtClean="0"/>
+              <a:rPr lang="en-US" dirty="0"/>
               <a:t>Elastic momentum</a:t>
             </a:r>
           </a:p>
           <a:p>
             <a:pPr lvl="1"/>
             <a:r>
-              <a:rPr lang="en-US" dirty="0" smtClean="0"/>
+              <a:rPr lang="en-US" dirty="0"/>
               <a:t>Excitation</a:t>
             </a:r>
           </a:p>
           <a:p>
             <a:pPr lvl="1"/>
             <a:r>
-              <a:rPr lang="en-US" dirty="0" smtClean="0"/>
+              <a:rPr lang="en-US" dirty="0"/>
               <a:t>Ionization</a:t>
             </a:r>
           </a:p>
           <a:p>
             <a:r>
-              <a:rPr lang="en-US" dirty="0" smtClean="0"/>
+              <a:rPr lang="en-US" dirty="0"/>
               <a:t>Cross sections are interpolated to energy grid using a linear interpolation on a log log scale</a:t>
             </a:r>
           </a:p>
           <a:p>
             <a:r>
-              <a:rPr lang="en-US" dirty="0" smtClean="0"/>
+              <a:rPr lang="en-US" dirty="0"/>
               <a:t>Cross sections are extrapolated to higher energy assuming </a:t>
             </a:r>
             <a:r>
-              <a:rPr lang="en-US" dirty="0" err="1" smtClean="0"/>
+              <a:rPr lang="en-US" dirty="0" err="1"/>
               <a:t>ln</a:t>
             </a:r>
             <a:r>
-              <a:rPr lang="en-US" dirty="0" smtClean="0"/>
+              <a:rPr lang="en-US" dirty="0"/>
               <a:t>(</a:t>
             </a:r>
             <a:r>
@@ -5920,7 +5844,7 @@
               <a:t>ε</a:t>
             </a:r>
             <a:r>
-              <a:rPr lang="en-US" dirty="0" smtClean="0"/>
+              <a:rPr lang="en-US" dirty="0"/>
               <a:t>)/</a:t>
             </a:r>
             <a:r>
@@ -5928,43 +5852,43 @@
               <a:t>ε</a:t>
             </a:r>
             <a:r>
-              <a:rPr lang="en-US" dirty="0" smtClean="0"/>
+              <a:rPr lang="en-US" dirty="0"/>
               <a:t> scaling for allowed transitions and 1/ε</a:t>
             </a:r>
             <a:r>
-              <a:rPr lang="en-US" baseline="30000" dirty="0" smtClean="0"/>
+              <a:rPr lang="en-US" baseline="30000" dirty="0"/>
               <a:t>3</a:t>
             </a:r>
             <a:r>
-              <a:rPr lang="en-US" dirty="0" smtClean="0"/>
+              <a:rPr lang="en-US" dirty="0"/>
               <a:t> for forbidden transitions</a:t>
             </a:r>
           </a:p>
           <a:p>
             <a:r>
-              <a:rPr lang="en-US" dirty="0" smtClean="0"/>
+              <a:rPr lang="en-US" dirty="0"/>
               <a:t>Governing equation is discretized in energy space using a 2</a:t>
             </a:r>
             <a:r>
-              <a:rPr lang="en-US" baseline="30000" dirty="0" smtClean="0"/>
+              <a:rPr lang="en-US" baseline="30000" dirty="0"/>
               <a:t>nd</a:t>
             </a:r>
             <a:r>
-              <a:rPr lang="en-US" dirty="0" smtClean="0"/>
+              <a:rPr lang="en-US" dirty="0"/>
               <a:t> order finite volume algorithm and is solved in time implicitly using a 2</a:t>
             </a:r>
             <a:r>
-              <a:rPr lang="en-US" baseline="30000" dirty="0" smtClean="0"/>
+              <a:rPr lang="en-US" baseline="30000" dirty="0"/>
               <a:t>nd</a:t>
             </a:r>
             <a:r>
-              <a:rPr lang="en-US" dirty="0" smtClean="0"/>
+              <a:rPr lang="en-US" dirty="0"/>
               <a:t> order Crank-Nicolson method with predictor-corrector algorithm for nonlocal source terms.</a:t>
             </a:r>
           </a:p>
           <a:p>
             <a:r>
-              <a:rPr lang="en-US" dirty="0" smtClean="0"/>
+              <a:rPr lang="en-US" dirty="0"/>
               <a:t>Simulation time step computed based upon energy dependent rate of change of EEDF and is adaptable (runs faster as the solution approaches equilibrium)</a:t>
             </a:r>
           </a:p>
@@ -5980,13 +5904,6 @@
   <p:clrMapOvr>
     <a:masterClrMapping/>
   </p:clrMapOvr>
-  <p:timing>
-    <p:tnLst>
-      <p:par>
-        <p:cTn xmlns:p14="http://schemas.microsoft.com/office/powerpoint/2010/main" id="1" dur="indefinite" restart="never" nodeType="tmRoot"/>
-      </p:par>
-    </p:tnLst>
-  </p:timing>
 </p:sld>
 </file>
 
@@ -6025,18 +5942,17 @@
           <a:lstStyle/>
           <a:p>
             <a:r>
-              <a:rPr lang="en-US" sz="3600" dirty="0" smtClean="0"/>
+              <a:rPr lang="en-US" sz="3600" dirty="0"/>
               <a:t>Test 1: N</a:t>
             </a:r>
             <a:r>
-              <a:rPr lang="en-US" sz="3600" baseline="-25000" dirty="0" smtClean="0"/>
+              <a:rPr lang="en-US" sz="3600" baseline="-25000" dirty="0"/>
               <a:t>2</a:t>
             </a:r>
             <a:r>
-              <a:rPr lang="en-US" sz="3600" dirty="0" smtClean="0"/>
+              <a:rPr lang="en-US" sz="3600" dirty="0"/>
               <a:t> EEDF evolution with only elastic collision</a:t>
             </a:r>
-            <a:endParaRPr lang="en-US" sz="3600" dirty="0"/>
           </a:p>
         </p:txBody>
       </p:sp>
@@ -6096,26 +6012,26 @@
               <a:buChar char="•"/>
             </a:pPr>
             <a:r>
-              <a:rPr lang="en-US" sz="2000" dirty="0" smtClean="0"/>
+              <a:rPr lang="en-US" sz="2000" dirty="0"/>
               <a:t>Initial EEDF is Maxwellian with </a:t>
             </a:r>
             <a:r>
-              <a:rPr lang="en-US" sz="2000" dirty="0" err="1" smtClean="0"/>
+              <a:rPr lang="en-US" sz="2000" dirty="0" err="1"/>
               <a:t>T</a:t>
             </a:r>
             <a:r>
-              <a:rPr lang="en-US" sz="2000" baseline="-25000" dirty="0" err="1" smtClean="0"/>
+              <a:rPr lang="en-US" sz="2000" baseline="-25000" dirty="0" err="1"/>
               <a:t>e</a:t>
             </a:r>
             <a:r>
-              <a:rPr lang="en-US" sz="2000" dirty="0" smtClean="0"/>
+              <a:rPr lang="en-US" sz="2000" dirty="0"/>
               <a:t>=10 </a:t>
             </a:r>
             <a:r>
-              <a:rPr lang="en-US" sz="2000" dirty="0" err="1" smtClean="0"/>
+              <a:rPr lang="en-US" sz="2000" dirty="0" err="1"/>
               <a:t>eV</a:t>
             </a:r>
-            <a:endParaRPr lang="en-US" sz="2000" dirty="0" smtClean="0"/>
+            <a:endParaRPr lang="en-US" sz="2000" dirty="0"/>
           </a:p>
           <a:p>
             <a:pPr marL="285750" indent="-285750">
@@ -6123,20 +6039,16 @@
               <a:buChar char="•"/>
             </a:pPr>
             <a:r>
-              <a:rPr lang="en-US" sz="2000" dirty="0" err="1" smtClean="0"/>
+              <a:rPr lang="en-US" sz="2000" dirty="0" err="1"/>
               <a:t>P</a:t>
             </a:r>
             <a:r>
-              <a:rPr lang="en-US" sz="2000" baseline="-25000" dirty="0" err="1" smtClean="0"/>
+              <a:rPr lang="en-US" sz="2000" baseline="-25000" dirty="0" err="1"/>
               <a:t>g</a:t>
             </a:r>
             <a:r>
-              <a:rPr lang="en-US" sz="2000" dirty="0" smtClean="0"/>
-              <a:t>=1Torr</a:t>
-            </a:r>
-            <a:r>
               <a:rPr lang="en-US" sz="2000" dirty="0"/>
-              <a:t>, </a:t>
+              <a:t>=1Torr, </a:t>
             </a:r>
             <a:r>
               <a:rPr lang="en-US" sz="2000" dirty="0" err="1"/>
@@ -6148,11 +6060,7 @@
             </a:r>
             <a:r>
               <a:rPr lang="en-US" sz="2000" dirty="0"/>
-              <a:t>=300K, E=300V/</a:t>
-            </a:r>
-            <a:r>
-              <a:rPr lang="en-US" sz="2000" dirty="0" smtClean="0"/>
-              <a:t>m</a:t>
+              <a:t>=300K, E=300V/m</a:t>
             </a:r>
           </a:p>
           <a:p>
@@ -6161,7 +6069,7 @@
               <a:buChar char="•"/>
             </a:pPr>
             <a:r>
-              <a:rPr lang="en-US" sz="2000" dirty="0" smtClean="0"/>
+              <a:rPr lang="en-US" sz="2000" dirty="0"/>
               <a:t>Cross section set for N2 includes elastic momentum exchange only.</a:t>
             </a:r>
           </a:p>
@@ -6171,7 +6079,7 @@
               <a:buChar char="•"/>
             </a:pPr>
             <a:r>
-              <a:rPr lang="en-US" sz="2000" dirty="0" smtClean="0"/>
+              <a:rPr lang="en-US" sz="2000" dirty="0"/>
               <a:t>Steady state solution obtained analytically</a:t>
             </a:r>
           </a:p>
@@ -6187,13 +6095,6 @@
   <p:clrMapOvr>
     <a:masterClrMapping/>
   </p:clrMapOvr>
-  <p:timing>
-    <p:tnLst>
-      <p:par>
-        <p:cTn xmlns:p14="http://schemas.microsoft.com/office/powerpoint/2010/main" id="1" dur="indefinite" restart="never" nodeType="tmRoot"/>
-      </p:par>
-    </p:tnLst>
-  </p:timing>
 </p:sld>
 </file>
 
@@ -6232,18 +6133,17 @@
           <a:lstStyle/>
           <a:p>
             <a:r>
-              <a:rPr lang="en-US" sz="3600" dirty="0" smtClean="0"/>
+              <a:rPr lang="en-US" sz="3600" dirty="0"/>
               <a:t>Test 2: N</a:t>
             </a:r>
             <a:r>
-              <a:rPr lang="en-US" sz="3600" baseline="-25000" dirty="0" smtClean="0"/>
+              <a:rPr lang="en-US" sz="3600" baseline="-25000" dirty="0"/>
               <a:t>2</a:t>
             </a:r>
             <a:r>
-              <a:rPr lang="en-US" sz="3600" dirty="0" smtClean="0"/>
+              <a:rPr lang="en-US" sz="3600" dirty="0"/>
               <a:t> EEDF evolution for E/N = 100 Td</a:t>
             </a:r>
-            <a:endParaRPr lang="en-US" sz="3600" dirty="0"/>
           </a:p>
         </p:txBody>
       </p:sp>
@@ -6302,26 +6202,22 @@
               <a:buChar char="•"/>
             </a:pPr>
             <a:r>
-              <a:rPr lang="en-US" sz="1600" dirty="0" smtClean="0"/>
+              <a:rPr lang="en-US" sz="1600" dirty="0"/>
               <a:t>Initial EEDF is Maxwellian with </a:t>
             </a:r>
             <a:r>
-              <a:rPr lang="en-US" sz="1600" dirty="0" err="1" smtClean="0"/>
+              <a:rPr lang="en-US" sz="1600" dirty="0" err="1"/>
               <a:t>Te</a:t>
             </a:r>
             <a:r>
               <a:rPr lang="en-US" sz="1600" dirty="0"/>
-              <a:t> </a:t>
-            </a:r>
-            <a:r>
-              <a:rPr lang="en-US" sz="1600" dirty="0" smtClean="0"/>
-              <a:t>= 4 </a:t>
-            </a:r>
-            <a:r>
-              <a:rPr lang="en-US" sz="1600" dirty="0" err="1" smtClean="0"/>
+              <a:t> = 4 </a:t>
+            </a:r>
+            <a:r>
+              <a:rPr lang="en-US" sz="1600" dirty="0" err="1"/>
               <a:t>eV</a:t>
             </a:r>
-            <a:endParaRPr lang="en-US" sz="1600" dirty="0" smtClean="0"/>
+            <a:endParaRPr lang="en-US" sz="1600" dirty="0"/>
           </a:p>
           <a:p>
             <a:pPr marL="285750" indent="-285750">
@@ -6329,27 +6225,27 @@
               <a:buChar char="•"/>
             </a:pPr>
             <a:r>
-              <a:rPr lang="en-US" sz="1600" dirty="0" err="1" smtClean="0"/>
+              <a:rPr lang="en-US" sz="1600" dirty="0" err="1"/>
               <a:t>P</a:t>
             </a:r>
             <a:r>
-              <a:rPr lang="en-US" sz="1600" baseline="-25000" dirty="0" err="1" smtClean="0"/>
+              <a:rPr lang="en-US" sz="1600" baseline="-25000" dirty="0" err="1"/>
               <a:t>g</a:t>
             </a:r>
             <a:r>
-              <a:rPr lang="en-US" sz="1600" dirty="0" smtClean="0"/>
+              <a:rPr lang="en-US" sz="1600" dirty="0"/>
               <a:t>=1Torr, </a:t>
             </a:r>
             <a:r>
-              <a:rPr lang="en-US" sz="1600" dirty="0" err="1" smtClean="0"/>
+              <a:rPr lang="en-US" sz="1600" dirty="0" err="1"/>
               <a:t>T</a:t>
             </a:r>
             <a:r>
-              <a:rPr lang="en-US" sz="1600" baseline="-25000" dirty="0" err="1" smtClean="0"/>
+              <a:rPr lang="en-US" sz="1600" baseline="-25000" dirty="0" err="1"/>
               <a:t>g</a:t>
             </a:r>
             <a:r>
-              <a:rPr lang="en-US" sz="1600" dirty="0" smtClean="0"/>
+              <a:rPr lang="en-US" sz="1600" dirty="0"/>
               <a:t>=300K, E=3.22kV/m</a:t>
             </a:r>
           </a:p>
@@ -6359,7 +6255,7 @@
               <a:buChar char="•"/>
             </a:pPr>
             <a:r>
-              <a:rPr lang="en-US" sz="1600" dirty="0" smtClean="0"/>
+              <a:rPr lang="en-US" sz="1600" dirty="0"/>
               <a:t>Cross section set for N2 includes elastic momentum, 10 vibrational excitations, 11 electronic excitations, 1 ionization, and 1 dissociative ionization.</a:t>
             </a:r>
           </a:p>
@@ -6369,7 +6265,7 @@
               <a:buChar char="•"/>
             </a:pPr>
             <a:r>
-              <a:rPr lang="en-US" sz="1600" dirty="0" smtClean="0"/>
+              <a:rPr lang="en-US" sz="1600" dirty="0"/>
               <a:t>Steady state solution obtained from COMSOL (BOLSIG)</a:t>
             </a:r>
           </a:p>
@@ -6385,13 +6281,6 @@
   <p:clrMapOvr>
     <a:masterClrMapping/>
   </p:clrMapOvr>
-  <p:timing>
-    <p:tnLst>
-      <p:par>
-        <p:cTn xmlns:p14="http://schemas.microsoft.com/office/powerpoint/2010/main" id="1" dur="indefinite" restart="never" nodeType="tmRoot"/>
-      </p:par>
-    </p:tnLst>
-  </p:timing>
 </p:sld>
 </file>
 
@@ -6430,18 +6319,17 @@
           <a:lstStyle/>
           <a:p>
             <a:r>
-              <a:rPr lang="en-US" sz="3600" dirty="0" smtClean="0"/>
+              <a:rPr lang="en-US" sz="3600" dirty="0"/>
               <a:t>Test 3: N</a:t>
             </a:r>
             <a:r>
-              <a:rPr lang="en-US" sz="3600" baseline="-25000" dirty="0" smtClean="0"/>
+              <a:rPr lang="en-US" sz="3600" baseline="-25000" dirty="0"/>
               <a:t>2</a:t>
             </a:r>
             <a:r>
-              <a:rPr lang="en-US" sz="3600" dirty="0" smtClean="0"/>
+              <a:rPr lang="en-US" sz="3600" dirty="0"/>
               <a:t> EEDF evolution for E/N = 1000 Td with equal energy sharing for ionization</a:t>
             </a:r>
-            <a:endParaRPr lang="en-US" sz="3600" dirty="0"/>
           </a:p>
         </p:txBody>
       </p:sp>
@@ -6501,26 +6389,22 @@
               <a:buChar char="•"/>
             </a:pPr>
             <a:r>
-              <a:rPr lang="en-US" sz="1600" dirty="0" smtClean="0"/>
+              <a:rPr lang="en-US" sz="1600" dirty="0"/>
               <a:t>Initial EEDF is Maxwellian with </a:t>
             </a:r>
             <a:r>
-              <a:rPr lang="en-US" sz="1600" dirty="0" err="1" smtClean="0"/>
+              <a:rPr lang="en-US" sz="1600" dirty="0" err="1"/>
               <a:t>Te</a:t>
             </a:r>
             <a:r>
               <a:rPr lang="en-US" sz="1600" dirty="0"/>
-              <a:t> </a:t>
-            </a:r>
-            <a:r>
-              <a:rPr lang="en-US" sz="1600" dirty="0" smtClean="0"/>
-              <a:t>= 4 </a:t>
-            </a:r>
-            <a:r>
-              <a:rPr lang="en-US" sz="1600" dirty="0" err="1" smtClean="0"/>
+              <a:t> = 4 </a:t>
+            </a:r>
+            <a:r>
+              <a:rPr lang="en-US" sz="1600" dirty="0" err="1"/>
               <a:t>eV</a:t>
             </a:r>
-            <a:endParaRPr lang="en-US" sz="1600" dirty="0" smtClean="0"/>
+            <a:endParaRPr lang="en-US" sz="1600" dirty="0"/>
           </a:p>
           <a:p>
             <a:pPr marL="285750" indent="-285750">
@@ -6528,27 +6412,27 @@
               <a:buChar char="•"/>
             </a:pPr>
             <a:r>
-              <a:rPr lang="en-US" sz="1600" dirty="0" err="1" smtClean="0"/>
+              <a:rPr lang="en-US" sz="1600" dirty="0" err="1"/>
               <a:t>P</a:t>
             </a:r>
             <a:r>
-              <a:rPr lang="en-US" sz="1600" baseline="-25000" dirty="0" err="1" smtClean="0"/>
+              <a:rPr lang="en-US" sz="1600" baseline="-25000" dirty="0" err="1"/>
               <a:t>g</a:t>
             </a:r>
             <a:r>
-              <a:rPr lang="en-US" sz="1600" dirty="0" smtClean="0"/>
+              <a:rPr lang="en-US" sz="1600" dirty="0"/>
               <a:t>=1Torr, </a:t>
             </a:r>
             <a:r>
-              <a:rPr lang="en-US" sz="1600" dirty="0" err="1" smtClean="0"/>
+              <a:rPr lang="en-US" sz="1600" dirty="0" err="1"/>
               <a:t>T</a:t>
             </a:r>
             <a:r>
-              <a:rPr lang="en-US" sz="1600" baseline="-25000" dirty="0" err="1" smtClean="0"/>
+              <a:rPr lang="en-US" sz="1600" baseline="-25000" dirty="0" err="1"/>
               <a:t>g</a:t>
             </a:r>
             <a:r>
-              <a:rPr lang="en-US" sz="1600" dirty="0" smtClean="0"/>
+              <a:rPr lang="en-US" sz="1600" dirty="0"/>
               <a:t>=300K, E=32.2kV/m, equal energy sharing</a:t>
             </a:r>
           </a:p>
@@ -6558,7 +6442,7 @@
               <a:buChar char="•"/>
             </a:pPr>
             <a:r>
-              <a:rPr lang="en-US" sz="1600" dirty="0" smtClean="0"/>
+              <a:rPr lang="en-US" sz="1600" dirty="0"/>
               <a:t>Cross section set for N2 includes elastic momentum, 10 vibrational excitations, 11 electronic excitations, 1 ionization, and 1 dissociative ionization.</a:t>
             </a:r>
           </a:p>
@@ -6568,7 +6452,7 @@
               <a:buChar char="•"/>
             </a:pPr>
             <a:r>
-              <a:rPr lang="en-US" sz="1600" dirty="0" smtClean="0"/>
+              <a:rPr lang="en-US" sz="1600" dirty="0"/>
               <a:t>Steady state solution obtained from COMSOL (BOLSIG)</a:t>
             </a:r>
           </a:p>
@@ -6584,13 +6468,6 @@
   <p:clrMapOvr>
     <a:masterClrMapping/>
   </p:clrMapOvr>
-  <p:timing>
-    <p:tnLst>
-      <p:par>
-        <p:cTn xmlns:p14="http://schemas.microsoft.com/office/powerpoint/2010/main" id="1" dur="indefinite" restart="never" nodeType="tmRoot"/>
-      </p:par>
-    </p:tnLst>
-  </p:timing>
 </p:sld>
 </file>
 
@@ -6629,26 +6506,25 @@
           <a:lstStyle/>
           <a:p>
             <a:r>
-              <a:rPr lang="en-US" sz="3600" dirty="0" smtClean="0"/>
+              <a:rPr lang="en-US" sz="3600" dirty="0"/>
               <a:t>Test 4: N</a:t>
             </a:r>
             <a:r>
-              <a:rPr lang="en-US" sz="3600" baseline="-25000" dirty="0" smtClean="0"/>
+              <a:rPr lang="en-US" sz="3600" baseline="-25000" dirty="0"/>
               <a:t>2</a:t>
             </a:r>
             <a:r>
-              <a:rPr lang="en-US" sz="3600" dirty="0" smtClean="0"/>
+              <a:rPr lang="en-US" sz="3600" dirty="0"/>
               <a:t> EEDF evolution for E/N = 1000 Td </a:t>
             </a:r>
             <a:r>
-              <a:rPr lang="en-US" sz="3600" smtClean="0"/>
+              <a:rPr lang="en-US" sz="3600"/>
               <a:t>with zero </a:t>
             </a:r>
             <a:r>
-              <a:rPr lang="en-US" sz="3600" dirty="0" smtClean="0"/>
+              <a:rPr lang="en-US" sz="3600" dirty="0"/>
               <a:t>energy sharing for ionization</a:t>
             </a:r>
-            <a:endParaRPr lang="en-US" sz="3600" dirty="0"/>
           </a:p>
         </p:txBody>
       </p:sp>
@@ -6708,26 +6584,22 @@
               <a:buChar char="•"/>
             </a:pPr>
             <a:r>
-              <a:rPr lang="en-US" sz="1600" dirty="0" smtClean="0"/>
+              <a:rPr lang="en-US" sz="1600" dirty="0"/>
               <a:t>Initial EEDF is Maxwellian with </a:t>
             </a:r>
             <a:r>
-              <a:rPr lang="en-US" sz="1600" dirty="0" err="1" smtClean="0"/>
+              <a:rPr lang="en-US" sz="1600" dirty="0" err="1"/>
               <a:t>Te</a:t>
             </a:r>
             <a:r>
               <a:rPr lang="en-US" sz="1600" dirty="0"/>
-              <a:t> </a:t>
-            </a:r>
-            <a:r>
-              <a:rPr lang="en-US" sz="1600" dirty="0" smtClean="0"/>
-              <a:t>= 4 </a:t>
-            </a:r>
-            <a:r>
-              <a:rPr lang="en-US" sz="1600" dirty="0" err="1" smtClean="0"/>
+              <a:t> = 4 </a:t>
+            </a:r>
+            <a:r>
+              <a:rPr lang="en-US" sz="1600" dirty="0" err="1"/>
               <a:t>eV</a:t>
             </a:r>
-            <a:endParaRPr lang="en-US" sz="1600" dirty="0" smtClean="0"/>
+            <a:endParaRPr lang="en-US" sz="1600" dirty="0"/>
           </a:p>
           <a:p>
             <a:pPr marL="285750" indent="-285750">
@@ -6735,27 +6607,27 @@
               <a:buChar char="•"/>
             </a:pPr>
             <a:r>
-              <a:rPr lang="en-US" sz="1600" dirty="0" err="1" smtClean="0"/>
+              <a:rPr lang="en-US" sz="1600" dirty="0" err="1"/>
               <a:t>P</a:t>
             </a:r>
             <a:r>
-              <a:rPr lang="en-US" sz="1600" baseline="-25000" dirty="0" err="1" smtClean="0"/>
+              <a:rPr lang="en-US" sz="1600" baseline="-25000" dirty="0" err="1"/>
               <a:t>g</a:t>
             </a:r>
             <a:r>
-              <a:rPr lang="en-US" sz="1600" dirty="0" smtClean="0"/>
+              <a:rPr lang="en-US" sz="1600" dirty="0"/>
               <a:t>=1Torr, </a:t>
             </a:r>
             <a:r>
-              <a:rPr lang="en-US" sz="1600" dirty="0" err="1" smtClean="0"/>
+              <a:rPr lang="en-US" sz="1600" dirty="0" err="1"/>
               <a:t>T</a:t>
             </a:r>
             <a:r>
-              <a:rPr lang="en-US" sz="1600" baseline="-25000" dirty="0" err="1" smtClean="0"/>
+              <a:rPr lang="en-US" sz="1600" baseline="-25000" dirty="0" err="1"/>
               <a:t>g</a:t>
             </a:r>
             <a:r>
-              <a:rPr lang="en-US" sz="1600" dirty="0" smtClean="0"/>
+              <a:rPr lang="en-US" sz="1600" dirty="0"/>
               <a:t>=300K, E=32.2kV/m, zero energy sharing</a:t>
             </a:r>
           </a:p>
@@ -6765,7 +6637,7 @@
               <a:buChar char="•"/>
             </a:pPr>
             <a:r>
-              <a:rPr lang="en-US" sz="1600" dirty="0" smtClean="0"/>
+              <a:rPr lang="en-US" sz="1600" dirty="0"/>
               <a:t>Cross section set for N2 includes elastic momentum, 10 vibrational excitations, 11 electronic excitations, 1 ionization, and 1 dissociative ionization.</a:t>
             </a:r>
           </a:p>
@@ -6775,7 +6647,7 @@
               <a:buChar char="•"/>
             </a:pPr>
             <a:r>
-              <a:rPr lang="en-US" sz="1600" dirty="0" smtClean="0"/>
+              <a:rPr lang="en-US" sz="1600" dirty="0"/>
               <a:t>Steady state solution obtained from COMSOL (BOLSIG)</a:t>
             </a:r>
           </a:p>
@@ -6791,13 +6663,6 @@
   <p:clrMapOvr>
     <a:masterClrMapping/>
   </p:clrMapOvr>
-  <p:timing>
-    <p:tnLst>
-      <p:par>
-        <p:cTn xmlns:p14="http://schemas.microsoft.com/office/powerpoint/2010/main" id="1" dur="indefinite" restart="never" nodeType="tmRoot"/>
-      </p:par>
-    </p:tnLst>
-  </p:timing>
 </p:sld>
 </file>
 

</xml_diff>